<commit_message>
presentation of 1st sprint
</commit_message>
<xml_diff>
--- a/docs/GPW Analizer.pptx
+++ b/docs/GPW Analizer.pptx
@@ -8,6 +8,9 @@
     <p:sldId id="256" r:id="rId2"/>
     <p:sldId id="257" r:id="rId3"/>
     <p:sldId id="258" r:id="rId4"/>
+    <p:sldId id="259" r:id="rId5"/>
+    <p:sldId id="260" r:id="rId6"/>
+    <p:sldId id="261" r:id="rId7"/>
   </p:sldIdLst>
   <p:sldSz cx="12192000" cy="6858000"/>
   <p:notesSz cx="6858000" cy="9144000"/>
@@ -106,6 +109,11 @@
       </a:defRPr>
     </a:lvl9pPr>
   </p:defaultTextStyle>
+  <p:extLst>
+    <p:ext uri="{EFAFB233-063F-42B5-8137-9DF3F51BA10A}">
+      <p15:sldGuideLst xmlns:p15="http://schemas.microsoft.com/office/powerpoint/2012/main"/>
+    </p:ext>
+  </p:extLst>
 </p:presentation>
 </file>
 
@@ -6141,6 +6149,66 @@
           </a:p>
         </p:txBody>
       </p:sp>
+      <p:sp>
+        <p:nvSpPr>
+          <p:cNvPr id="4" name="TextBox 3"/>
+          <p:cNvSpPr txBox="1"/>
+          <p:nvPr/>
+        </p:nvSpPr>
+        <p:spPr>
+          <a:xfrm rot="10800000" flipH="1" flipV="1">
+            <a:off x="7439606" y="3577052"/>
+            <a:ext cx="3998013" cy="1200329"/>
+          </a:xfrm>
+          <a:prstGeom prst="rect">
+            <a:avLst/>
+          </a:prstGeom>
+          <a:noFill/>
+        </p:spPr>
+        <p:txBody>
+          <a:bodyPr wrap="square" rtlCol="0">
+            <a:spAutoFit/>
+          </a:bodyPr>
+          <a:lstStyle/>
+          <a:p>
+            <a:r>
+              <a:rPr lang="pl-PL" dirty="0" smtClean="0"/>
+              <a:t>Tomasz Kopacki</a:t>
+            </a:r>
+          </a:p>
+          <a:p>
+            <a:r>
+              <a:rPr lang="pl-PL" dirty="0"/>
+              <a:t>	</a:t>
+            </a:r>
+            <a:r>
+              <a:rPr lang="pl-PL" dirty="0" smtClean="0"/>
+              <a:t>Bartosz Kotrys</a:t>
+            </a:r>
+          </a:p>
+          <a:p>
+            <a:r>
+              <a:rPr lang="pl-PL" dirty="0"/>
+              <a:t>	</a:t>
+            </a:r>
+            <a:r>
+              <a:rPr lang="pl-PL" dirty="0" smtClean="0"/>
+              <a:t>	Maciej Skrzypiński</a:t>
+            </a:r>
+          </a:p>
+          <a:p>
+            <a:r>
+              <a:rPr lang="pl-PL" dirty="0"/>
+              <a:t>	</a:t>
+            </a:r>
+            <a:r>
+              <a:rPr lang="pl-PL" dirty="0" smtClean="0"/>
+              <a:t>		Paweł Szymankiewicz</a:t>
+            </a:r>
+            <a:endParaRPr lang="pl-PL" dirty="0"/>
+          </a:p>
+        </p:txBody>
+      </p:sp>
     </p:spTree>
     <p:extLst>
       <p:ext uri="{BB962C8B-B14F-4D97-AF65-F5344CB8AC3E}">
@@ -6151,6 +6219,13 @@
   <p:clrMapOvr>
     <a:masterClrMapping/>
   </p:clrMapOvr>
+  <p:timing>
+    <p:tnLst>
+      <p:par>
+        <p:cTn id="1" dur="indefinite" restart="never" nodeType="tmRoot"/>
+      </p:par>
+    </p:tnLst>
+  </p:timing>
 </p:sld>
 </file>
 
@@ -6343,7 +6418,7 @@
         </p:blipFill>
         <p:spPr bwMode="auto">
           <a:xfrm>
-            <a:off x="4310247" y="1536682"/>
+            <a:off x="4538357" y="1536682"/>
             <a:ext cx="2076450" cy="2076450"/>
           </a:xfrm>
           <a:prstGeom prst="rect">
@@ -6371,6 +6446,13 @@
   <p:clrMapOvr>
     <a:masterClrMapping/>
   </p:clrMapOvr>
+  <p:timing>
+    <p:tnLst>
+      <p:par>
+        <p:cTn id="1" dur="indefinite" restart="never" nodeType="tmRoot"/>
+      </p:par>
+    </p:tnLst>
+  </p:timing>
 </p:sld>
 </file>
 
@@ -6517,6 +6599,536 @@
   <p:clrMapOvr>
     <a:masterClrMapping/>
   </p:clrMapOvr>
+  <p:timing>
+    <p:tnLst>
+      <p:par>
+        <p:cTn id="1" dur="indefinite" restart="never" nodeType="tmRoot"/>
+      </p:par>
+    </p:tnLst>
+  </p:timing>
+</p:sld>
+</file>
+
+<file path=ppt/slides/slide4.xml><?xml version="1.0" encoding="utf-8"?>
+<p:sld xmlns:a="http://schemas.openxmlformats.org/drawingml/2006/main" xmlns:r="http://schemas.openxmlformats.org/officeDocument/2006/relationships" xmlns:p="http://schemas.openxmlformats.org/presentationml/2006/main">
+  <p:cSld>
+    <p:spTree>
+      <p:nvGrpSpPr>
+        <p:cNvPr id="1" name=""/>
+        <p:cNvGrpSpPr/>
+        <p:nvPr/>
+      </p:nvGrpSpPr>
+      <p:grpSpPr>
+        <a:xfrm>
+          <a:off x="0" y="0"/>
+          <a:ext cx="0" cy="0"/>
+          <a:chOff x="0" y="0"/>
+          <a:chExt cx="0" cy="0"/>
+        </a:xfrm>
+      </p:grpSpPr>
+      <p:sp>
+        <p:nvSpPr>
+          <p:cNvPr id="2" name="Title 1"/>
+          <p:cNvSpPr>
+            <a:spLocks noGrp="1"/>
+          </p:cNvSpPr>
+          <p:nvPr>
+            <p:ph type="title"/>
+          </p:nvPr>
+        </p:nvSpPr>
+        <p:spPr/>
+        <p:txBody>
+          <a:bodyPr/>
+          <a:lstStyle/>
+          <a:p>
+            <a:r>
+              <a:rPr lang="pl-PL" dirty="0" smtClean="0"/>
+              <a:t>Technologie</a:t>
+            </a:r>
+            <a:endParaRPr lang="pl-PL" dirty="0"/>
+          </a:p>
+        </p:txBody>
+      </p:sp>
+      <p:sp>
+        <p:nvSpPr>
+          <p:cNvPr id="3" name="Content Placeholder 2"/>
+          <p:cNvSpPr>
+            <a:spLocks noGrp="1"/>
+          </p:cNvSpPr>
+          <p:nvPr>
+            <p:ph idx="1"/>
+          </p:nvPr>
+        </p:nvSpPr>
+        <p:spPr>
+          <a:xfrm>
+            <a:off x="4255585" y="2252809"/>
+            <a:ext cx="4190583" cy="4195481"/>
+          </a:xfrm>
+        </p:spPr>
+        <p:txBody>
+          <a:bodyPr/>
+          <a:lstStyle/>
+          <a:p>
+            <a:r>
+              <a:rPr lang="pl-PL" dirty="0" smtClean="0"/>
+              <a:t>Ruby on Rails</a:t>
+            </a:r>
+          </a:p>
+          <a:p>
+            <a:r>
+              <a:rPr lang="pl-PL" dirty="0" smtClean="0"/>
+              <a:t>Java z pakietem Weka</a:t>
+            </a:r>
+          </a:p>
+          <a:p>
+            <a:r>
+              <a:rPr lang="pl-PL" dirty="0" smtClean="0"/>
+              <a:t>HTML5</a:t>
+            </a:r>
+          </a:p>
+          <a:p>
+            <a:r>
+              <a:rPr lang="pl-PL" dirty="0" smtClean="0"/>
+              <a:t>CSS3</a:t>
+            </a:r>
+          </a:p>
+          <a:p>
+            <a:r>
+              <a:rPr lang="pl-PL" dirty="0" smtClean="0"/>
+              <a:t>Bootstrap</a:t>
+            </a:r>
+          </a:p>
+          <a:p>
+            <a:r>
+              <a:rPr lang="pl-PL" dirty="0" smtClean="0"/>
+              <a:t>jQuery</a:t>
+            </a:r>
+          </a:p>
+          <a:p>
+            <a:r>
+              <a:rPr lang="pl-PL" dirty="0" smtClean="0"/>
+              <a:t>Baza danych PostgreSQL</a:t>
+            </a:r>
+          </a:p>
+        </p:txBody>
+      </p:sp>
+      <p:pic>
+        <p:nvPicPr>
+          <p:cNvPr id="5" name="Picture 4"/>
+          <p:cNvPicPr>
+            <a:picLocks noChangeAspect="1"/>
+          </p:cNvPicPr>
+          <p:nvPr/>
+        </p:nvPicPr>
+        <p:blipFill>
+          <a:blip r:embed="rId2">
+            <a:extLst>
+              <a:ext uri="{28A0092B-C50C-407E-A947-70E740481C1C}">
+                <a14:useLocalDpi xmlns:a14="http://schemas.microsoft.com/office/drawing/2010/main" val="0"/>
+              </a:ext>
+            </a:extLst>
+          </a:blip>
+          <a:stretch>
+            <a:fillRect/>
+          </a:stretch>
+        </p:blipFill>
+        <p:spPr>
+          <a:xfrm>
+            <a:off x="1335505" y="1435015"/>
+            <a:ext cx="2735141" cy="4810489"/>
+          </a:xfrm>
+          <a:prstGeom prst="rect">
+            <a:avLst/>
+          </a:prstGeom>
+        </p:spPr>
+      </p:pic>
+    </p:spTree>
+    <p:extLst>
+      <p:ext uri="{BB962C8B-B14F-4D97-AF65-F5344CB8AC3E}">
+        <p14:creationId xmlns:p14="http://schemas.microsoft.com/office/powerpoint/2010/main" val="4114348319"/>
+      </p:ext>
+    </p:extLst>
+  </p:cSld>
+  <p:clrMapOvr>
+    <a:masterClrMapping/>
+  </p:clrMapOvr>
+  <p:timing>
+    <p:tnLst>
+      <p:par>
+        <p:cTn id="1" dur="indefinite" restart="never" nodeType="tmRoot"/>
+      </p:par>
+    </p:tnLst>
+  </p:timing>
+</p:sld>
+</file>
+
+<file path=ppt/slides/slide5.xml><?xml version="1.0" encoding="utf-8"?>
+<p:sld xmlns:a="http://schemas.openxmlformats.org/drawingml/2006/main" xmlns:r="http://schemas.openxmlformats.org/officeDocument/2006/relationships" xmlns:p="http://schemas.openxmlformats.org/presentationml/2006/main">
+  <p:cSld>
+    <p:spTree>
+      <p:nvGrpSpPr>
+        <p:cNvPr id="1" name=""/>
+        <p:cNvGrpSpPr/>
+        <p:nvPr/>
+      </p:nvGrpSpPr>
+      <p:grpSpPr>
+        <a:xfrm>
+          <a:off x="0" y="0"/>
+          <a:ext cx="0" cy="0"/>
+          <a:chOff x="0" y="0"/>
+          <a:chExt cx="0" cy="0"/>
+        </a:xfrm>
+      </p:grpSpPr>
+      <p:sp>
+        <p:nvSpPr>
+          <p:cNvPr id="2" name="Title 1"/>
+          <p:cNvSpPr>
+            <a:spLocks noGrp="1"/>
+          </p:cNvSpPr>
+          <p:nvPr>
+            <p:ph type="title"/>
+          </p:nvPr>
+        </p:nvSpPr>
+        <p:spPr/>
+        <p:txBody>
+          <a:bodyPr/>
+          <a:lstStyle/>
+          <a:p>
+            <a:r>
+              <a:rPr lang="pl-PL" dirty="0" smtClean="0"/>
+              <a:t>Wspierane platformy	</a:t>
+            </a:r>
+            <a:endParaRPr lang="pl-PL" dirty="0"/>
+          </a:p>
+        </p:txBody>
+      </p:sp>
+      <p:pic>
+        <p:nvPicPr>
+          <p:cNvPr id="2050" name="Picture 2" descr="http://www.ubuntu-pomoc.org/wp-content/uploads/firefox-09-intro.png"/>
+          <p:cNvPicPr>
+            <a:picLocks noGrp="1" noChangeAspect="1" noChangeArrowheads="1"/>
+          </p:cNvPicPr>
+          <p:nvPr>
+            <p:ph idx="1"/>
+          </p:nvPr>
+        </p:nvPicPr>
+        <p:blipFill>
+          <a:blip r:embed="rId2">
+            <a:extLst>
+              <a:ext uri="{28A0092B-C50C-407E-A947-70E740481C1C}">
+                <a14:useLocalDpi xmlns:a14="http://schemas.microsoft.com/office/drawing/2010/main" val="0"/>
+              </a:ext>
+            </a:extLst>
+          </a:blip>
+          <a:srcRect/>
+          <a:stretch>
+            <a:fillRect/>
+          </a:stretch>
+        </p:blipFill>
+        <p:spPr bwMode="auto">
+          <a:xfrm>
+            <a:off x="674200" y="2841247"/>
+            <a:ext cx="1688015" cy="1688015"/>
+          </a:xfrm>
+          <a:prstGeom prst="rect">
+            <a:avLst/>
+          </a:prstGeom>
+          <a:noFill/>
+          <a:extLst>
+            <a:ext uri="{909E8E84-426E-40DD-AFC4-6F175D3DCCD1}">
+              <a14:hiddenFill xmlns:a14="http://schemas.microsoft.com/office/drawing/2010/main">
+                <a:solidFill>
+                  <a:srgbClr val="FFFFFF"/>
+                </a:solidFill>
+              </a14:hiddenFill>
+            </a:ext>
+          </a:extLst>
+        </p:spPr>
+      </p:pic>
+      <p:pic>
+        <p:nvPicPr>
+          <p:cNvPr id="2052" name="Picture 4" descr="http://images2.wikia.nocookie.net/__cb20111107151822/nonsensopedia/images/0/0d/Google-chrome.png"/>
+          <p:cNvPicPr>
+            <a:picLocks noChangeAspect="1" noChangeArrowheads="1"/>
+          </p:cNvPicPr>
+          <p:nvPr/>
+        </p:nvPicPr>
+        <p:blipFill>
+          <a:blip r:embed="rId3">
+            <a:extLst>
+              <a:ext uri="{28A0092B-C50C-407E-A947-70E740481C1C}">
+                <a14:useLocalDpi xmlns:a14="http://schemas.microsoft.com/office/drawing/2010/main" val="0"/>
+              </a:ext>
+            </a:extLst>
+          </a:blip>
+          <a:srcRect/>
+          <a:stretch>
+            <a:fillRect/>
+          </a:stretch>
+        </p:blipFill>
+        <p:spPr bwMode="auto">
+          <a:xfrm>
+            <a:off x="2775019" y="2841634"/>
+            <a:ext cx="1539657" cy="1539657"/>
+          </a:xfrm>
+          <a:prstGeom prst="rect">
+            <a:avLst/>
+          </a:prstGeom>
+          <a:noFill/>
+          <a:extLst>
+            <a:ext uri="{909E8E84-426E-40DD-AFC4-6F175D3DCCD1}">
+              <a14:hiddenFill xmlns:a14="http://schemas.microsoft.com/office/drawing/2010/main">
+                <a:solidFill>
+                  <a:srgbClr val="FFFFFF"/>
+                </a:solidFill>
+              </a14:hiddenFill>
+            </a:ext>
+          </a:extLst>
+        </p:spPr>
+      </p:pic>
+      <p:pic>
+        <p:nvPicPr>
+          <p:cNvPr id="2054" name="Picture 6" descr="https://cdn1.iconfinder.com/data/icons/imod/512/Software/iSafari.png"/>
+          <p:cNvPicPr>
+            <a:picLocks noChangeAspect="1" noChangeArrowheads="1"/>
+          </p:cNvPicPr>
+          <p:nvPr/>
+        </p:nvPicPr>
+        <p:blipFill>
+          <a:blip r:embed="rId4">
+            <a:extLst>
+              <a:ext uri="{28A0092B-C50C-407E-A947-70E740481C1C}">
+                <a14:useLocalDpi xmlns:a14="http://schemas.microsoft.com/office/drawing/2010/main" val="0"/>
+              </a:ext>
+            </a:extLst>
+          </a:blip>
+          <a:srcRect/>
+          <a:stretch>
+            <a:fillRect/>
+          </a:stretch>
+        </p:blipFill>
+        <p:spPr bwMode="auto">
+          <a:xfrm>
+            <a:off x="4966710" y="2841247"/>
+            <a:ext cx="1540044" cy="1540044"/>
+          </a:xfrm>
+          <a:prstGeom prst="rect">
+            <a:avLst/>
+          </a:prstGeom>
+          <a:noFill/>
+          <a:extLst>
+            <a:ext uri="{909E8E84-426E-40DD-AFC4-6F175D3DCCD1}">
+              <a14:hiddenFill xmlns:a14="http://schemas.microsoft.com/office/drawing/2010/main">
+                <a:solidFill>
+                  <a:srgbClr val="FFFFFF"/>
+                </a:solidFill>
+              </a14:hiddenFill>
+            </a:ext>
+          </a:extLst>
+        </p:spPr>
+      </p:pic>
+      <p:pic>
+        <p:nvPicPr>
+          <p:cNvPr id="2056" name="Picture 8" descr="http://upload.wikimedia.org/wikipedia/en/1/10/Internet_Explorer_7_Logo.png"/>
+          <p:cNvPicPr>
+            <a:picLocks noChangeAspect="1" noChangeArrowheads="1"/>
+          </p:cNvPicPr>
+          <p:nvPr/>
+        </p:nvPicPr>
+        <p:blipFill>
+          <a:blip r:embed="rId5">
+            <a:extLst>
+              <a:ext uri="{28A0092B-C50C-407E-A947-70E740481C1C}">
+                <a14:useLocalDpi xmlns:a14="http://schemas.microsoft.com/office/drawing/2010/main" val="0"/>
+              </a:ext>
+            </a:extLst>
+          </a:blip>
+          <a:srcRect/>
+          <a:stretch>
+            <a:fillRect/>
+          </a:stretch>
+        </p:blipFill>
+        <p:spPr bwMode="auto">
+          <a:xfrm>
+            <a:off x="7235827" y="2779646"/>
+            <a:ext cx="1527659" cy="1527659"/>
+          </a:xfrm>
+          <a:prstGeom prst="rect">
+            <a:avLst/>
+          </a:prstGeom>
+          <a:noFill/>
+          <a:extLst>
+            <a:ext uri="{909E8E84-426E-40DD-AFC4-6F175D3DCCD1}">
+              <a14:hiddenFill xmlns:a14="http://schemas.microsoft.com/office/drawing/2010/main">
+                <a:solidFill>
+                  <a:srgbClr val="FFFFFF"/>
+                </a:solidFill>
+              </a14:hiddenFill>
+            </a:ext>
+          </a:extLst>
+        </p:spPr>
+      </p:pic>
+      <p:pic>
+        <p:nvPicPr>
+          <p:cNvPr id="2058" name="Picture 10" descr="http://www.mobileworldmag.com/wp-content/uploads/2012/08/opera-logo-z2.png"/>
+          <p:cNvPicPr>
+            <a:picLocks noChangeAspect="1" noChangeArrowheads="1"/>
+          </p:cNvPicPr>
+          <p:nvPr/>
+        </p:nvPicPr>
+        <p:blipFill>
+          <a:blip r:embed="rId6">
+            <a:extLst>
+              <a:ext uri="{28A0092B-C50C-407E-A947-70E740481C1C}">
+                <a14:useLocalDpi xmlns:a14="http://schemas.microsoft.com/office/drawing/2010/main" val="0"/>
+              </a:ext>
+            </a:extLst>
+          </a:blip>
+          <a:srcRect/>
+          <a:stretch>
+            <a:fillRect/>
+          </a:stretch>
+        </p:blipFill>
+        <p:spPr bwMode="auto">
+          <a:xfrm>
+            <a:off x="9492559" y="2767261"/>
+            <a:ext cx="1310947" cy="1540044"/>
+          </a:xfrm>
+          <a:prstGeom prst="rect">
+            <a:avLst/>
+          </a:prstGeom>
+          <a:noFill/>
+          <a:extLst>
+            <a:ext uri="{909E8E84-426E-40DD-AFC4-6F175D3DCCD1}">
+              <a14:hiddenFill xmlns:a14="http://schemas.microsoft.com/office/drawing/2010/main">
+                <a:solidFill>
+                  <a:srgbClr val="FFFFFF"/>
+                </a:solidFill>
+              </a14:hiddenFill>
+            </a:ext>
+          </a:extLst>
+        </p:spPr>
+      </p:pic>
+    </p:spTree>
+    <p:extLst>
+      <p:ext uri="{BB962C8B-B14F-4D97-AF65-F5344CB8AC3E}">
+        <p14:creationId xmlns:p14="http://schemas.microsoft.com/office/powerpoint/2010/main" val="1124480036"/>
+      </p:ext>
+    </p:extLst>
+  </p:cSld>
+  <p:clrMapOvr>
+    <a:masterClrMapping/>
+  </p:clrMapOvr>
+  <p:timing>
+    <p:tnLst>
+      <p:par>
+        <p:cTn id="1" dur="indefinite" restart="never" nodeType="tmRoot"/>
+      </p:par>
+    </p:tnLst>
+  </p:timing>
+</p:sld>
+</file>
+
+<file path=ppt/slides/slide6.xml><?xml version="1.0" encoding="utf-8"?>
+<p:sld xmlns:a="http://schemas.openxmlformats.org/drawingml/2006/main" xmlns:r="http://schemas.openxmlformats.org/officeDocument/2006/relationships" xmlns:p="http://schemas.openxmlformats.org/presentationml/2006/main">
+  <p:cSld>
+    <p:spTree>
+      <p:nvGrpSpPr>
+        <p:cNvPr id="1" name=""/>
+        <p:cNvGrpSpPr/>
+        <p:nvPr/>
+      </p:nvGrpSpPr>
+      <p:grpSpPr>
+        <a:xfrm>
+          <a:off x="0" y="0"/>
+          <a:ext cx="0" cy="0"/>
+          <a:chOff x="0" y="0"/>
+          <a:chExt cx="0" cy="0"/>
+        </a:xfrm>
+      </p:grpSpPr>
+      <p:sp>
+        <p:nvSpPr>
+          <p:cNvPr id="2" name="Title 1"/>
+          <p:cNvSpPr>
+            <a:spLocks noGrp="1"/>
+          </p:cNvSpPr>
+          <p:nvPr>
+            <p:ph type="title"/>
+          </p:nvPr>
+        </p:nvSpPr>
+        <p:spPr/>
+        <p:txBody>
+          <a:bodyPr/>
+          <a:lstStyle/>
+          <a:p>
+            <a:r>
+              <a:rPr lang="pl-PL" dirty="0" smtClean="0"/>
+              <a:t>Rozwój aplikacji</a:t>
+            </a:r>
+            <a:endParaRPr lang="pl-PL" dirty="0"/>
+          </a:p>
+        </p:txBody>
+      </p:sp>
+      <p:pic>
+        <p:nvPicPr>
+          <p:cNvPr id="3074" name="Picture 2" descr=":*"/>
+          <p:cNvPicPr>
+            <a:picLocks noGrp="1" noChangeAspect="1" noChangeArrowheads="1"/>
+          </p:cNvPicPr>
+          <p:nvPr>
+            <p:ph idx="1"/>
+          </p:nvPr>
+        </p:nvPicPr>
+        <p:blipFill>
+          <a:blip r:embed="rId2">
+            <a:extLst>
+              <a:ext uri="{28A0092B-C50C-407E-A947-70E740481C1C}">
+                <a14:useLocalDpi xmlns:a14="http://schemas.microsoft.com/office/drawing/2010/main" val="0"/>
+              </a:ext>
+            </a:extLst>
+          </a:blip>
+          <a:srcRect/>
+          <a:stretch>
+            <a:fillRect/>
+          </a:stretch>
+        </p:blipFill>
+        <p:spPr bwMode="auto">
+          <a:xfrm>
+            <a:off x="2779713" y="2052638"/>
+            <a:ext cx="5594349" cy="4195762"/>
+          </a:xfrm>
+          <a:prstGeom prst="rect">
+            <a:avLst/>
+          </a:prstGeom>
+          <a:noFill/>
+          <a:extLst>
+            <a:ext uri="{909E8E84-426E-40DD-AFC4-6F175D3DCCD1}">
+              <a14:hiddenFill xmlns:a14="http://schemas.microsoft.com/office/drawing/2010/main">
+                <a:solidFill>
+                  <a:srgbClr val="FFFFFF"/>
+                </a:solidFill>
+              </a14:hiddenFill>
+            </a:ext>
+          </a:extLst>
+        </p:spPr>
+      </p:pic>
+    </p:spTree>
+    <p:extLst>
+      <p:ext uri="{BB962C8B-B14F-4D97-AF65-F5344CB8AC3E}">
+        <p14:creationId xmlns:p14="http://schemas.microsoft.com/office/powerpoint/2010/main" val="2924577399"/>
+      </p:ext>
+    </p:extLst>
+  </p:cSld>
+  <p:clrMapOvr>
+    <a:masterClrMapping/>
+  </p:clrMapOvr>
+  <p:timing>
+    <p:tnLst>
+      <p:par>
+        <p:cTn id="1" dur="indefinite" restart="never" nodeType="tmRoot"/>
+      </p:par>
+    </p:tnLst>
+  </p:timing>
 </p:sld>
 </file>
 

</xml_diff>